<commit_message>
Produce slide show PDF
</commit_message>
<xml_diff>
--- a/Game Of Life Presentation.pptx
+++ b/Game Of Life Presentation.pptx
@@ -19421,7 +19421,23 @@
                   <a:srgbClr val="262626"/>
                 </a:solidFill>
               </a:rPr>
-              <a:t>Parent to sibling or Sibling to parent</a:t>
+              <a:t>Parent to sibling </a:t>
+            </a:r>
+            <a:r>
+              <a:rPr lang="en-GB">
+                <a:solidFill>
+                  <a:srgbClr val="262626"/>
+                </a:solidFill>
+              </a:rPr>
+              <a:t>or sibling </a:t>
+            </a:r>
+            <a:r>
+              <a:rPr lang="en-GB" dirty="0">
+                <a:solidFill>
+                  <a:srgbClr val="262626"/>
+                </a:solidFill>
+              </a:rPr>
+              <a:t>to parent</a:t>
             </a:r>
           </a:p>
           <a:p>
@@ -19454,7 +19470,7 @@
                   <a:srgbClr val="262626"/>
                 </a:solidFill>
               </a:rPr>
-              <a:t>Redux to </a:t>
+              <a:t>Redux or </a:t>
             </a:r>
             <a:r>
               <a:rPr lang="en-GB" dirty="0" err="1">

</xml_diff>